<commit_message>
updated title txt on slide 5
</commit_message>
<xml_diff>
--- a/OSDMenu/Customizing OS Deployments in SCCM with PowerShell.pptx
+++ b/OSDMenu/Customizing OS Deployments in SCCM with PowerShell.pptx
@@ -115,6 +115,22 @@
       </a:defRPr>
     </a:lvl9pPr>
   </p:defaultTextStyle>
+  <p:extLst>
+    <p:ext uri="{EFAFB233-063F-42B5-8137-9DF3F51BA10A}">
+      <p15:sldGuideLst xmlns:p15="http://schemas.microsoft.com/office/powerpoint/2012/main">
+        <p15:guide id="1" orient="horz" pos="2160">
+          <p15:clr>
+            <a:srgbClr val="A4A3A4"/>
+          </p15:clr>
+        </p15:guide>
+        <p15:guide id="2" pos="3840">
+          <p15:clr>
+            <a:srgbClr val="A4A3A4"/>
+          </p15:clr>
+        </p15:guide>
+      </p15:sldGuideLst>
+    </p:ext>
+  </p:extLst>
 </p:presentation>
 </file>
 
@@ -4019,7 +4035,6 @@
               <a:rPr lang="en-US" dirty="0" smtClean="0"/>
               <a:t>mrbodean.azurewebsites.net</a:t>
             </a:r>
-            <a:endParaRPr lang="en-US" dirty="0" smtClean="0"/>
           </a:p>
           <a:p>
             <a:r>
@@ -5081,11 +5096,11 @@
           <a:p>
             <a:r>
               <a:rPr lang="en-US" dirty="0" smtClean="0"/>
-              <a:t>Create the </a:t>
-            </a:r>
-            <a:r>
-              <a:rPr lang="en-US" dirty="0" err="1" smtClean="0"/>
-              <a:t>Gui</a:t>
+              <a:t>Create </a:t>
+            </a:r>
+            <a:r>
+              <a:rPr lang="en-US" dirty="0" smtClean="0"/>
+              <a:t>the Menu</a:t>
             </a:r>
             <a:endParaRPr lang="en-US" dirty="0"/>
           </a:p>
@@ -5846,7 +5861,7 @@
   <a:extraClrSchemeLst/>
   <a:extLst>
     <a:ext uri="{05A4C25C-085E-4340-85A3-A5531E510DB2}">
-      <thm15:themeFamily xmlns:thm15="http://schemas.microsoft.com/office/thememl/2012/main" xmlns="" name="Office Theme" id="{62F939B6-93AF-4DB8-9C6B-D6C7DFDC589F}" vid="{4A3C46E8-61CC-4603-A589-7422A47A8E4A}"/>
+      <thm15:themeFamily xmlns:thm15="http://schemas.microsoft.com/office/thememl/2012/main" name="Office Theme" id="{62F939B6-93AF-4DB8-9C6B-D6C7DFDC589F}" vid="{4A3C46E8-61CC-4603-A589-7422A47A8E4A}"/>
     </a:ext>
   </a:extLst>
 </a:theme>
@@ -6107,7 +6122,7 @@
   <a:extraClrSchemeLst/>
   <a:extLst>
     <a:ext uri="{05A4C25C-085E-4340-85A3-A5531E510DB2}">
-      <thm15:themeFamily xmlns:thm15="http://schemas.microsoft.com/office/thememl/2012/main" xmlns="" name="Office Theme" id="{62F939B6-93AF-4DB8-9C6B-D6C7DFDC589F}" vid="{4A3C46E8-61CC-4603-A589-7422A47A8E4A}"/>
+      <thm15:themeFamily xmlns:thm15="http://schemas.microsoft.com/office/thememl/2012/main" name="Office Theme" id="{62F939B6-93AF-4DB8-9C6B-D6C7DFDC589F}" vid="{4A3C46E8-61CC-4603-A589-7422A47A8E4A}"/>
     </a:ext>
   </a:extLst>
 </a:theme>

</xml_diff>